<commit_message>
Integrating TZ effect on nesting capacity Effect for both resource and nesting is now a trait parameter in the FT_definition file
</commit_message>
<xml_diff>
--- a/Flowchart.pptx
+++ b/Flowchart.pptx
@@ -6,6 +6,7 @@
   </p:sldMasterIdLst>
   <p:sldIdLst>
     <p:sldId id="256" r:id="rId2"/>
+    <p:sldId id="257" r:id="rId3"/>
   </p:sldIdLst>
   <p:sldSz cx="6858000" cy="9906000" type="A4"/>
   <p:notesSz cx="6797675" cy="9874250"/>
@@ -243,7 +244,7 @@
           <a:p>
             <a:fld id="{47194A9C-1375-4CE9-B20F-B0D332DBA49C}" type="datetimeFigureOut">
               <a:rPr lang="de-DE" smtClean="0"/>
-              <a:t>23.01.2020</a:t>
+              <a:t>24.03.2020</a:t>
             </a:fld>
             <a:endParaRPr lang="de-DE"/>
           </a:p>
@@ -413,7 +414,7 @@
           <a:p>
             <a:fld id="{47194A9C-1375-4CE9-B20F-B0D332DBA49C}" type="datetimeFigureOut">
               <a:rPr lang="de-DE" smtClean="0"/>
-              <a:t>23.01.2020</a:t>
+              <a:t>24.03.2020</a:t>
             </a:fld>
             <a:endParaRPr lang="de-DE"/>
           </a:p>
@@ -593,7 +594,7 @@
           <a:p>
             <a:fld id="{47194A9C-1375-4CE9-B20F-B0D332DBA49C}" type="datetimeFigureOut">
               <a:rPr lang="de-DE" smtClean="0"/>
-              <a:t>23.01.2020</a:t>
+              <a:t>24.03.2020</a:t>
             </a:fld>
             <a:endParaRPr lang="de-DE"/>
           </a:p>
@@ -763,7 +764,7 @@
           <a:p>
             <a:fld id="{47194A9C-1375-4CE9-B20F-B0D332DBA49C}" type="datetimeFigureOut">
               <a:rPr lang="de-DE" smtClean="0"/>
-              <a:t>23.01.2020</a:t>
+              <a:t>24.03.2020</a:t>
             </a:fld>
             <a:endParaRPr lang="de-DE"/>
           </a:p>
@@ -1007,7 +1008,7 @@
           <a:p>
             <a:fld id="{47194A9C-1375-4CE9-B20F-B0D332DBA49C}" type="datetimeFigureOut">
               <a:rPr lang="de-DE" smtClean="0"/>
-              <a:t>23.01.2020</a:t>
+              <a:t>24.03.2020</a:t>
             </a:fld>
             <a:endParaRPr lang="de-DE"/>
           </a:p>
@@ -1239,7 +1240,7 @@
           <a:p>
             <a:fld id="{47194A9C-1375-4CE9-B20F-B0D332DBA49C}" type="datetimeFigureOut">
               <a:rPr lang="de-DE" smtClean="0"/>
-              <a:t>23.01.2020</a:t>
+              <a:t>24.03.2020</a:t>
             </a:fld>
             <a:endParaRPr lang="de-DE"/>
           </a:p>
@@ -1606,7 +1607,7 @@
           <a:p>
             <a:fld id="{47194A9C-1375-4CE9-B20F-B0D332DBA49C}" type="datetimeFigureOut">
               <a:rPr lang="de-DE" smtClean="0"/>
-              <a:t>23.01.2020</a:t>
+              <a:t>24.03.2020</a:t>
             </a:fld>
             <a:endParaRPr lang="de-DE"/>
           </a:p>
@@ -1724,7 +1725,7 @@
           <a:p>
             <a:fld id="{47194A9C-1375-4CE9-B20F-B0D332DBA49C}" type="datetimeFigureOut">
               <a:rPr lang="de-DE" smtClean="0"/>
-              <a:t>23.01.2020</a:t>
+              <a:t>24.03.2020</a:t>
             </a:fld>
             <a:endParaRPr lang="de-DE"/>
           </a:p>
@@ -1819,7 +1820,7 @@
           <a:p>
             <a:fld id="{47194A9C-1375-4CE9-B20F-B0D332DBA49C}" type="datetimeFigureOut">
               <a:rPr lang="de-DE" smtClean="0"/>
-              <a:t>23.01.2020</a:t>
+              <a:t>24.03.2020</a:t>
             </a:fld>
             <a:endParaRPr lang="de-DE"/>
           </a:p>
@@ -2096,7 +2097,7 @@
           <a:p>
             <a:fld id="{47194A9C-1375-4CE9-B20F-B0D332DBA49C}" type="datetimeFigureOut">
               <a:rPr lang="de-DE" smtClean="0"/>
-              <a:t>23.01.2020</a:t>
+              <a:t>24.03.2020</a:t>
             </a:fld>
             <a:endParaRPr lang="de-DE"/>
           </a:p>
@@ -2353,7 +2354,7 @@
           <a:p>
             <a:fld id="{47194A9C-1375-4CE9-B20F-B0D332DBA49C}" type="datetimeFigureOut">
               <a:rPr lang="de-DE" smtClean="0"/>
-              <a:t>23.01.2020</a:t>
+              <a:t>24.03.2020</a:t>
             </a:fld>
             <a:endParaRPr lang="de-DE"/>
           </a:p>
@@ -2566,7 +2567,7 @@
           <a:p>
             <a:fld id="{47194A9C-1375-4CE9-B20F-B0D332DBA49C}" type="datetimeFigureOut">
               <a:rPr lang="de-DE" smtClean="0"/>
-              <a:t>23.01.2020</a:t>
+              <a:t>24.03.2020</a:t>
             </a:fld>
             <a:endParaRPr lang="de-DE"/>
           </a:p>
@@ -2973,14 +2974,14 @@
       </p:grpSpPr>
       <p:sp>
         <p:nvSpPr>
-          <p:cNvPr id="40" name="Rechteck 39"/>
+          <p:cNvPr id="42" name="Rechteck 41"/>
           <p:cNvSpPr/>
           <p:nvPr/>
         </p:nvSpPr>
         <p:spPr>
           <a:xfrm>
-            <a:off x="2994660" y="5667772"/>
-            <a:ext cx="3735621" cy="956037"/>
+            <a:off x="4962307" y="8780169"/>
+            <a:ext cx="1754027" cy="958191"/>
           </a:xfrm>
           <a:prstGeom prst="rect">
             <a:avLst/>
@@ -3016,6 +3017,92 @@
       </p:sp>
       <p:sp>
         <p:nvSpPr>
+          <p:cNvPr id="41" name="Rechteck 40"/>
+          <p:cNvSpPr/>
+          <p:nvPr/>
+        </p:nvSpPr>
+        <p:spPr>
+          <a:xfrm>
+            <a:off x="4962308" y="6235116"/>
+            <a:ext cx="1767973" cy="2490432"/>
+          </a:xfrm>
+          <a:prstGeom prst="rect">
+            <a:avLst/>
+          </a:prstGeom>
+          <a:solidFill>
+            <a:srgbClr val="70AD47">
+              <a:alpha val="30196"/>
+            </a:srgbClr>
+          </a:solidFill>
+        </p:spPr>
+        <p:style>
+          <a:lnRef idx="3">
+            <a:schemeClr val="lt1"/>
+          </a:lnRef>
+          <a:fillRef idx="1">
+            <a:schemeClr val="accent6"/>
+          </a:fillRef>
+          <a:effectRef idx="1">
+            <a:schemeClr val="accent6"/>
+          </a:effectRef>
+          <a:fontRef idx="minor">
+            <a:schemeClr val="lt1"/>
+          </a:fontRef>
+        </p:style>
+        <p:txBody>
+          <a:bodyPr rtlCol="0" anchor="ctr"/>
+          <a:lstStyle/>
+          <a:p>
+            <a:pPr algn="ctr"/>
+            <a:endParaRPr lang="de-DE"/>
+          </a:p>
+        </p:txBody>
+      </p:sp>
+      <p:sp>
+        <p:nvSpPr>
+          <p:cNvPr id="40" name="Rechteck 39"/>
+          <p:cNvSpPr/>
+          <p:nvPr/>
+        </p:nvSpPr>
+        <p:spPr>
+          <a:xfrm>
+            <a:off x="2998836" y="5230486"/>
+            <a:ext cx="3735621" cy="956037"/>
+          </a:xfrm>
+          <a:prstGeom prst="rect">
+            <a:avLst/>
+          </a:prstGeom>
+          <a:solidFill>
+            <a:srgbClr val="70AD47">
+              <a:alpha val="30196"/>
+            </a:srgbClr>
+          </a:solidFill>
+        </p:spPr>
+        <p:style>
+          <a:lnRef idx="3">
+            <a:schemeClr val="lt1"/>
+          </a:lnRef>
+          <a:fillRef idx="1">
+            <a:schemeClr val="accent6"/>
+          </a:fillRef>
+          <a:effectRef idx="1">
+            <a:schemeClr val="accent6"/>
+          </a:effectRef>
+          <a:fontRef idx="minor">
+            <a:schemeClr val="lt1"/>
+          </a:fontRef>
+        </p:style>
+        <p:txBody>
+          <a:bodyPr rtlCol="0" anchor="ctr"/>
+          <a:lstStyle/>
+          <a:p>
+            <a:pPr algn="ctr"/>
+            <a:endParaRPr lang="de-DE"/>
+          </a:p>
+        </p:txBody>
+      </p:sp>
+      <p:sp>
+        <p:nvSpPr>
           <p:cNvPr id="4" name="Textfeld 3"/>
           <p:cNvSpPr txBox="1"/>
           <p:nvPr/>
@@ -3083,7 +3170,7 @@
         <p:spPr>
           <a:xfrm>
             <a:off x="4974672" y="176169"/>
-            <a:ext cx="1459054" cy="1892826"/>
+            <a:ext cx="1741662" cy="1892826"/>
           </a:xfrm>
           <a:prstGeom prst="rect">
             <a:avLst/>
@@ -3095,7 +3182,7 @@
           </a:solidFill>
         </p:spPr>
         <p:txBody>
-          <a:bodyPr wrap="none" rtlCol="0">
+          <a:bodyPr wrap="square" rtlCol="0">
             <a:spAutoFit/>
           </a:bodyPr>
           <a:lstStyle/>
@@ -3670,7 +3757,7 @@
         <p:spPr>
           <a:xfrm>
             <a:off x="4970778" y="2144087"/>
-            <a:ext cx="1065401" cy="923330"/>
+            <a:ext cx="1745556" cy="646331"/>
           </a:xfrm>
           <a:prstGeom prst="rect">
             <a:avLst/>
@@ -3984,7 +4071,7 @@
         <p:spPr>
           <a:xfrm>
             <a:off x="4970506" y="3134389"/>
-            <a:ext cx="1459054" cy="1754326"/>
+            <a:ext cx="1745828" cy="1615827"/>
           </a:xfrm>
           <a:prstGeom prst="rect">
             <a:avLst/>
@@ -4386,6 +4473,77 @@
                 </a:solidFill>
                 <a:sym typeface="Wingdings" panose="05000000000000000000" pitchFamily="2" charset="2"/>
               </a:rPr>
+              <a:t> maximal </a:t>
+            </a:r>
+            <a:r>
+              <a:rPr lang="de-DE" sz="900" dirty="0" err="1" smtClean="0">
+                <a:solidFill>
+                  <a:schemeClr val="tx1"/>
+                </a:solidFill>
+                <a:sym typeface="Wingdings" panose="05000000000000000000" pitchFamily="2" charset="2"/>
+              </a:rPr>
+              <a:t>nest</a:t>
+            </a:r>
+            <a:r>
+              <a:rPr lang="de-DE" sz="900" dirty="0" smtClean="0">
+                <a:solidFill>
+                  <a:schemeClr val="tx1"/>
+                </a:solidFill>
+                <a:sym typeface="Wingdings" panose="05000000000000000000" pitchFamily="2" charset="2"/>
+              </a:rPr>
+              <a:t> </a:t>
+            </a:r>
+            <a:r>
+              <a:rPr lang="de-DE" sz="900" dirty="0" err="1" smtClean="0">
+                <a:solidFill>
+                  <a:schemeClr val="tx1"/>
+                </a:solidFill>
+                <a:sym typeface="Wingdings" panose="05000000000000000000" pitchFamily="2" charset="2"/>
+              </a:rPr>
+              <a:t>capacity</a:t>
+            </a:r>
+            <a:r>
+              <a:rPr lang="de-DE" sz="900" dirty="0" smtClean="0">
+                <a:solidFill>
+                  <a:schemeClr val="tx1"/>
+                </a:solidFill>
+                <a:sym typeface="Wingdings" panose="05000000000000000000" pitchFamily="2" charset="2"/>
+              </a:rPr>
+              <a:t> in </a:t>
+            </a:r>
+            <a:r>
+              <a:rPr lang="de-DE" sz="900" dirty="0" err="1" smtClean="0">
+                <a:solidFill>
+                  <a:schemeClr val="tx1"/>
+                </a:solidFill>
+                <a:sym typeface="Wingdings" panose="05000000000000000000" pitchFamily="2" charset="2"/>
+              </a:rPr>
+              <a:t>range</a:t>
+            </a:r>
+            <a:endParaRPr lang="de-DE" sz="900" dirty="0" smtClean="0">
+              <a:solidFill>
+                <a:schemeClr val="tx1"/>
+              </a:solidFill>
+              <a:sym typeface="Wingdings" panose="05000000000000000000" pitchFamily="2" charset="2"/>
+            </a:endParaRPr>
+          </a:p>
+          <a:p>
+            <a:r>
+              <a:rPr lang="de-DE" sz="900" dirty="0" err="1" smtClean="0">
+                <a:solidFill>
+                  <a:schemeClr val="tx1"/>
+                </a:solidFill>
+                <a:sym typeface="Wingdings" panose="05000000000000000000" pitchFamily="2" charset="2"/>
+              </a:rPr>
+              <a:t>Define</a:t>
+            </a:r>
+            <a:r>
+              <a:rPr lang="de-DE" sz="900" dirty="0" smtClean="0">
+                <a:solidFill>
+                  <a:schemeClr val="tx1"/>
+                </a:solidFill>
+                <a:sym typeface="Wingdings" panose="05000000000000000000" pitchFamily="2" charset="2"/>
+              </a:rPr>
               <a:t> </a:t>
             </a:r>
             <a:r>
@@ -4819,8 +4977,8 @@
         </p:nvSpPr>
         <p:spPr>
           <a:xfrm>
-            <a:off x="4962308" y="5103150"/>
-            <a:ext cx="1459054" cy="507831"/>
+            <a:off x="4962308" y="4812561"/>
+            <a:ext cx="1754026" cy="369332"/>
           </a:xfrm>
           <a:prstGeom prst="rect">
             <a:avLst/>
@@ -4923,7 +5081,7 @@
         </p:nvSpPr>
         <p:spPr>
           <a:xfrm>
-            <a:off x="4970506" y="6254477"/>
+            <a:off x="4985031" y="5817924"/>
             <a:ext cx="938077" cy="369332"/>
           </a:xfrm>
           <a:prstGeom prst="rect">
@@ -5005,7 +5163,7 @@
         </p:blipFill>
         <p:spPr>
           <a:xfrm>
-            <a:off x="3058255" y="5667772"/>
+            <a:off x="3062431" y="5230486"/>
             <a:ext cx="3658080" cy="653712"/>
           </a:xfrm>
           <a:prstGeom prst="rect">
@@ -5021,7 +5179,7 @@
         </p:nvSpPr>
         <p:spPr>
           <a:xfrm>
-            <a:off x="4974672" y="6754625"/>
+            <a:off x="4974672" y="6217729"/>
             <a:ext cx="1755609" cy="369332"/>
           </a:xfrm>
           <a:prstGeom prst="rect">
@@ -5095,7 +5253,7 @@
         </p:blipFill>
         <p:spPr>
           <a:xfrm>
-            <a:off x="5045309" y="6980920"/>
+            <a:off x="5045309" y="6444024"/>
             <a:ext cx="1684972" cy="286073"/>
           </a:xfrm>
           <a:prstGeom prst="rect">
@@ -5111,7 +5269,7 @@
         </p:nvSpPr>
         <p:spPr>
           <a:xfrm>
-            <a:off x="4974671" y="7264017"/>
+            <a:off x="4974671" y="6727121"/>
             <a:ext cx="1212191" cy="507831"/>
           </a:xfrm>
           <a:prstGeom prst="rect">
@@ -5180,7 +5338,7 @@
         </p:blipFill>
         <p:spPr>
           <a:xfrm>
-            <a:off x="5045309" y="7458854"/>
+            <a:off x="5045309" y="6921958"/>
             <a:ext cx="1351569" cy="185358"/>
           </a:xfrm>
           <a:prstGeom prst="rect">
@@ -5196,7 +5354,7 @@
         </p:nvSpPr>
         <p:spPr>
           <a:xfrm>
-            <a:off x="4974670" y="7604227"/>
+            <a:off x="4974670" y="7067331"/>
             <a:ext cx="1061509" cy="646331"/>
           </a:xfrm>
           <a:prstGeom prst="rect">
@@ -5260,7 +5418,7 @@
         </p:blipFill>
         <p:spPr>
           <a:xfrm>
-            <a:off x="5084896" y="8510301"/>
+            <a:off x="5084896" y="7973405"/>
             <a:ext cx="841056" cy="215247"/>
           </a:xfrm>
           <a:prstGeom prst="rect">
@@ -5290,7 +5448,7 @@
         </p:blipFill>
         <p:spPr>
           <a:xfrm>
-            <a:off x="5064180" y="8271980"/>
+            <a:off x="5064180" y="7735084"/>
             <a:ext cx="1271706" cy="185380"/>
           </a:xfrm>
           <a:prstGeom prst="rect">
@@ -5320,7 +5478,7 @@
         </p:blipFill>
         <p:spPr>
           <a:xfrm>
-            <a:off x="5064180" y="7848087"/>
+            <a:off x="5064180" y="7311191"/>
             <a:ext cx="1328934" cy="361548"/>
           </a:xfrm>
           <a:prstGeom prst="rect">
@@ -5481,92 +5639,6 @@
           </a:p>
           <a:p>
             <a:endParaRPr lang="de-DE" sz="900" dirty="0"/>
-          </a:p>
-        </p:txBody>
-      </p:sp>
-      <p:sp>
-        <p:nvSpPr>
-          <p:cNvPr id="41" name="Rechteck 40"/>
-          <p:cNvSpPr/>
-          <p:nvPr/>
-        </p:nvSpPr>
-        <p:spPr>
-          <a:xfrm>
-            <a:off x="4962308" y="6678430"/>
-            <a:ext cx="1754027" cy="2047118"/>
-          </a:xfrm>
-          <a:prstGeom prst="rect">
-            <a:avLst/>
-          </a:prstGeom>
-          <a:solidFill>
-            <a:srgbClr val="70AD47">
-              <a:alpha val="30196"/>
-            </a:srgbClr>
-          </a:solidFill>
-        </p:spPr>
-        <p:style>
-          <a:lnRef idx="3">
-            <a:schemeClr val="lt1"/>
-          </a:lnRef>
-          <a:fillRef idx="1">
-            <a:schemeClr val="accent6"/>
-          </a:fillRef>
-          <a:effectRef idx="1">
-            <a:schemeClr val="accent6"/>
-          </a:effectRef>
-          <a:fontRef idx="minor">
-            <a:schemeClr val="lt1"/>
-          </a:fontRef>
-        </p:style>
-        <p:txBody>
-          <a:bodyPr rtlCol="0" anchor="ctr"/>
-          <a:lstStyle/>
-          <a:p>
-            <a:pPr algn="ctr"/>
-            <a:endParaRPr lang="de-DE"/>
-          </a:p>
-        </p:txBody>
-      </p:sp>
-      <p:sp>
-        <p:nvSpPr>
-          <p:cNvPr id="42" name="Rechteck 41"/>
-          <p:cNvSpPr/>
-          <p:nvPr/>
-        </p:nvSpPr>
-        <p:spPr>
-          <a:xfrm>
-            <a:off x="4962307" y="8780169"/>
-            <a:ext cx="1754027" cy="958191"/>
-          </a:xfrm>
-          <a:prstGeom prst="rect">
-            <a:avLst/>
-          </a:prstGeom>
-          <a:solidFill>
-            <a:srgbClr val="70AD47">
-              <a:alpha val="30196"/>
-            </a:srgbClr>
-          </a:solidFill>
-        </p:spPr>
-        <p:style>
-          <a:lnRef idx="3">
-            <a:schemeClr val="lt1"/>
-          </a:lnRef>
-          <a:fillRef idx="1">
-            <a:schemeClr val="accent6"/>
-          </a:fillRef>
-          <a:effectRef idx="1">
-            <a:schemeClr val="accent6"/>
-          </a:effectRef>
-          <a:fontRef idx="minor">
-            <a:schemeClr val="lt1"/>
-          </a:fontRef>
-        </p:style>
-        <p:txBody>
-          <a:bodyPr rtlCol="0" anchor="ctr"/>
-          <a:lstStyle/>
-          <a:p>
-            <a:pPr algn="ctr"/>
-            <a:endParaRPr lang="de-DE"/>
           </a:p>
         </p:txBody>
       </p:sp>
@@ -6443,7 +6515,7 @@
         <p:spPr>
           <a:xfrm>
             <a:off x="4591616" y="1525590"/>
-            <a:ext cx="379162" cy="1080162"/>
+            <a:ext cx="379162" cy="941663"/>
           </a:xfrm>
           <a:prstGeom prst="bentConnector3">
             <a:avLst>
@@ -6481,11 +6553,11 @@
         <p:spPr>
           <a:xfrm>
             <a:off x="2702185" y="3175506"/>
-            <a:ext cx="2268321" cy="836046"/>
+            <a:ext cx="2268321" cy="766797"/>
           </a:xfrm>
           <a:prstGeom prst="bentConnector3">
             <a:avLst>
-              <a:gd name="adj1" fmla="val 63101"/>
+              <a:gd name="adj1" fmla="val 50000"/>
             </a:avLst>
           </a:prstGeom>
           <a:ln>
@@ -6519,11 +6591,11 @@
         <p:spPr>
           <a:xfrm>
             <a:off x="2172962" y="3770425"/>
-            <a:ext cx="2789346" cy="1586641"/>
+            <a:ext cx="2789346" cy="1226802"/>
           </a:xfrm>
           <a:prstGeom prst="bentConnector3">
             <a:avLst>
-              <a:gd name="adj1" fmla="val 55464"/>
+              <a:gd name="adj1" fmla="val 56917"/>
             </a:avLst>
           </a:prstGeom>
           <a:ln>
@@ -6557,11 +6629,11 @@
         <p:spPr>
           <a:xfrm>
             <a:off x="2101898" y="4386960"/>
-            <a:ext cx="892762" cy="1758831"/>
+            <a:ext cx="896938" cy="1321545"/>
           </a:xfrm>
           <a:prstGeom prst="bentConnector3">
             <a:avLst>
-              <a:gd name="adj1" fmla="val 85848"/>
+              <a:gd name="adj1" fmla="val 84606"/>
             </a:avLst>
           </a:prstGeom>
           <a:ln>
@@ -6595,11 +6667,11 @@
         <p:spPr>
           <a:xfrm>
             <a:off x="2195685" y="5003495"/>
-            <a:ext cx="2766623" cy="2698494"/>
+            <a:ext cx="2766623" cy="2476837"/>
           </a:xfrm>
           <a:prstGeom prst="bentConnector3">
             <a:avLst>
-              <a:gd name="adj1" fmla="val 21355"/>
+              <a:gd name="adj1" fmla="val 22104"/>
             </a:avLst>
           </a:prstGeom>
           <a:ln>
@@ -6731,10 +6803,1515 @@
           </a:fontRef>
         </p:style>
       </p:cxnSp>
+      <p:sp>
+        <p:nvSpPr>
+          <p:cNvPr id="72" name="Textfeld 71"/>
+          <p:cNvSpPr txBox="1"/>
+          <p:nvPr/>
+        </p:nvSpPr>
+        <p:spPr>
+          <a:xfrm>
+            <a:off x="4954646" y="8207146"/>
+            <a:ext cx="1775635" cy="646331"/>
+          </a:xfrm>
+          <a:prstGeom prst="rect">
+            <a:avLst/>
+          </a:prstGeom>
+          <a:noFill/>
+        </p:spPr>
+        <p:txBody>
+          <a:bodyPr wrap="square" rtlCol="0">
+            <a:spAutoFit/>
+          </a:bodyPr>
+          <a:lstStyle/>
+          <a:p>
+            <a:r>
+              <a:rPr lang="de-DE" sz="900" dirty="0" smtClean="0"/>
+              <a:t>Individual </a:t>
+            </a:r>
+            <a:r>
+              <a:rPr lang="de-DE" sz="900" dirty="0" err="1" smtClean="0"/>
+              <a:t>tries</a:t>
+            </a:r>
+            <a:r>
+              <a:rPr lang="de-DE" sz="900" dirty="0" smtClean="0"/>
+              <a:t> </a:t>
+            </a:r>
+            <a:r>
+              <a:rPr lang="de-DE" sz="900" dirty="0" err="1" smtClean="0"/>
+              <a:t>to</a:t>
+            </a:r>
+            <a:r>
+              <a:rPr lang="de-DE" sz="900" dirty="0" smtClean="0"/>
+              <a:t> find </a:t>
+            </a:r>
+            <a:r>
+              <a:rPr lang="de-DE" sz="900" dirty="0" err="1" smtClean="0"/>
+              <a:t>the</a:t>
+            </a:r>
+            <a:r>
+              <a:rPr lang="de-DE" sz="900" dirty="0" smtClean="0"/>
+              <a:t> </a:t>
+            </a:r>
+            <a:r>
+              <a:rPr lang="de-DE" sz="900" dirty="0" err="1" smtClean="0"/>
+              <a:t>most</a:t>
+            </a:r>
+            <a:r>
+              <a:rPr lang="de-DE" sz="900" dirty="0" smtClean="0"/>
+              <a:t> </a:t>
+            </a:r>
+            <a:r>
+              <a:rPr lang="de-DE" sz="900" dirty="0" err="1" smtClean="0"/>
+              <a:t>suitable</a:t>
+            </a:r>
+            <a:r>
+              <a:rPr lang="de-DE" sz="900" dirty="0" smtClean="0"/>
+              <a:t> </a:t>
+            </a:r>
+            <a:r>
+              <a:rPr lang="de-DE" sz="900" dirty="0" err="1" smtClean="0"/>
+              <a:t>cell</a:t>
+            </a:r>
+            <a:r>
+              <a:rPr lang="de-DE" sz="900" dirty="0" smtClean="0"/>
+              <a:t>; </a:t>
+            </a:r>
+            <a:r>
+              <a:rPr lang="de-DE" sz="900" dirty="0" err="1" smtClean="0"/>
+              <a:t>with</a:t>
+            </a:r>
+            <a:r>
+              <a:rPr lang="de-DE" sz="900" dirty="0" smtClean="0"/>
+              <a:t> </a:t>
+            </a:r>
+            <a:r>
+              <a:rPr lang="de-DE" sz="900" dirty="0" err="1" smtClean="0"/>
+              <a:t>increasing</a:t>
+            </a:r>
+            <a:r>
+              <a:rPr lang="de-DE" sz="900" dirty="0" smtClean="0"/>
+              <a:t> </a:t>
+            </a:r>
+            <a:r>
+              <a:rPr lang="de-DE" sz="900" dirty="0" err="1" smtClean="0"/>
+              <a:t>nb</a:t>
+            </a:r>
+            <a:r>
+              <a:rPr lang="de-DE" sz="900" dirty="0" smtClean="0"/>
+              <a:t> </a:t>
+            </a:r>
+            <a:r>
+              <a:rPr lang="de-DE" sz="900" dirty="0" err="1" smtClean="0"/>
+              <a:t>of</a:t>
+            </a:r>
+            <a:r>
+              <a:rPr lang="de-DE" sz="900" dirty="0" smtClean="0"/>
+              <a:t> </a:t>
+            </a:r>
+            <a:r>
+              <a:rPr lang="de-DE" sz="900" dirty="0" err="1" smtClean="0"/>
+              <a:t>attemps</a:t>
+            </a:r>
+            <a:r>
+              <a:rPr lang="de-DE" sz="900" dirty="0" smtClean="0"/>
+              <a:t>, a </a:t>
+            </a:r>
+            <a:r>
+              <a:rPr lang="de-DE" sz="900" dirty="0" err="1" smtClean="0"/>
+              <a:t>lower</a:t>
+            </a:r>
+            <a:r>
+              <a:rPr lang="de-DE" sz="900" dirty="0" smtClean="0"/>
+              <a:t> </a:t>
+            </a:r>
+            <a:r>
+              <a:rPr lang="de-DE" sz="900" dirty="0" err="1" smtClean="0"/>
+              <a:t>one</a:t>
+            </a:r>
+            <a:endParaRPr lang="de-DE" sz="900" dirty="0" smtClean="0"/>
+          </a:p>
+          <a:p>
+            <a:endParaRPr lang="de-DE" sz="900" dirty="0"/>
+          </a:p>
+        </p:txBody>
+      </p:sp>
     </p:spTree>
     <p:extLst>
       <p:ext uri="{BB962C8B-B14F-4D97-AF65-F5344CB8AC3E}">
         <p14:creationId xmlns:p14="http://schemas.microsoft.com/office/powerpoint/2010/main" val="2285795657"/>
+      </p:ext>
+    </p:extLst>
+  </p:cSld>
+  <p:clrMapOvr>
+    <a:masterClrMapping/>
+  </p:clrMapOvr>
+</p:sld>
+</file>
+
+<file path=ppt/slides/slide2.xml><?xml version="1.0" encoding="utf-8"?>
+<p:sld xmlns:a="http://schemas.openxmlformats.org/drawingml/2006/main" xmlns:r="http://schemas.openxmlformats.org/officeDocument/2006/relationships" xmlns:p="http://schemas.openxmlformats.org/presentationml/2006/main">
+  <p:cSld>
+    <p:spTree>
+      <p:nvGrpSpPr>
+        <p:cNvPr id="1" name=""/>
+        <p:cNvGrpSpPr/>
+        <p:nvPr/>
+      </p:nvGrpSpPr>
+      <p:grpSpPr>
+        <a:xfrm>
+          <a:off x="0" y="0"/>
+          <a:ext cx="0" cy="0"/>
+          <a:chOff x="0" y="0"/>
+          <a:chExt cx="0" cy="0"/>
+        </a:xfrm>
+      </p:grpSpPr>
+      <p:sp>
+        <p:nvSpPr>
+          <p:cNvPr id="4" name="Textfeld 3"/>
+          <p:cNvSpPr txBox="1"/>
+          <p:nvPr/>
+        </p:nvSpPr>
+        <p:spPr>
+          <a:xfrm>
+            <a:off x="232457" y="310167"/>
+            <a:ext cx="1288045" cy="276999"/>
+          </a:xfrm>
+          <a:prstGeom prst="rect">
+            <a:avLst/>
+          </a:prstGeom>
+          <a:solidFill>
+            <a:schemeClr val="accent1">
+              <a:lumMod val="50000"/>
+            </a:schemeClr>
+          </a:solidFill>
+        </p:spPr>
+        <p:style>
+          <a:lnRef idx="3">
+            <a:schemeClr val="lt1"/>
+          </a:lnRef>
+          <a:fillRef idx="1">
+            <a:schemeClr val="accent1"/>
+          </a:fillRef>
+          <a:effectRef idx="1">
+            <a:schemeClr val="accent1"/>
+          </a:effectRef>
+          <a:fontRef idx="minor">
+            <a:schemeClr val="lt1"/>
+          </a:fontRef>
+        </p:style>
+        <p:txBody>
+          <a:bodyPr wrap="none" rtlCol="0">
+            <a:spAutoFit/>
+          </a:bodyPr>
+          <a:lstStyle/>
+          <a:p>
+            <a:r>
+              <a:rPr lang="de-DE" sz="1200" dirty="0" smtClean="0"/>
+              <a:t>Read </a:t>
+            </a:r>
+            <a:r>
+              <a:rPr lang="de-DE" sz="1200" dirty="0" err="1" smtClean="0"/>
+              <a:t>scenario</a:t>
+            </a:r>
+            <a:r>
+              <a:rPr lang="de-DE" sz="1200" dirty="0" smtClean="0"/>
+              <a:t> </a:t>
+            </a:r>
+            <a:r>
+              <a:rPr lang="de-DE" sz="1200" dirty="0" err="1" smtClean="0"/>
+              <a:t>file</a:t>
+            </a:r>
+            <a:endParaRPr lang="de-DE" sz="1200" dirty="0"/>
+          </a:p>
+        </p:txBody>
+      </p:sp>
+      <p:sp>
+        <p:nvSpPr>
+          <p:cNvPr id="7" name="Textfeld 6"/>
+          <p:cNvSpPr txBox="1"/>
+          <p:nvPr/>
+        </p:nvSpPr>
+        <p:spPr>
+          <a:xfrm>
+            <a:off x="1986999" y="1327105"/>
+            <a:ext cx="1364541" cy="276999"/>
+          </a:xfrm>
+          <a:prstGeom prst="rect">
+            <a:avLst/>
+          </a:prstGeom>
+          <a:solidFill>
+            <a:srgbClr val="2E75B6">
+              <a:alpha val="80000"/>
+            </a:srgbClr>
+          </a:solidFill>
+        </p:spPr>
+        <p:style>
+          <a:lnRef idx="3">
+            <a:schemeClr val="lt1"/>
+          </a:lnRef>
+          <a:fillRef idx="1">
+            <a:schemeClr val="accent1"/>
+          </a:fillRef>
+          <a:effectRef idx="1">
+            <a:schemeClr val="accent1"/>
+          </a:effectRef>
+          <a:fontRef idx="minor">
+            <a:schemeClr val="lt1"/>
+          </a:fontRef>
+        </p:style>
+        <p:txBody>
+          <a:bodyPr wrap="none" rtlCol="0">
+            <a:spAutoFit/>
+          </a:bodyPr>
+          <a:lstStyle/>
+          <a:p>
+            <a:r>
+              <a:rPr lang="de-DE" sz="1200" dirty="0" smtClean="0"/>
+              <a:t>Initialize </a:t>
+            </a:r>
+            <a:r>
+              <a:rPr lang="de-DE" sz="1200" dirty="0" err="1" smtClean="0"/>
+              <a:t>landscape</a:t>
+            </a:r>
+            <a:endParaRPr lang="de-DE" sz="1200" dirty="0" smtClean="0"/>
+          </a:p>
+        </p:txBody>
+      </p:sp>
+      <p:sp>
+        <p:nvSpPr>
+          <p:cNvPr id="8" name="Textfeld 7"/>
+          <p:cNvSpPr txBox="1"/>
+          <p:nvPr/>
+        </p:nvSpPr>
+        <p:spPr>
+          <a:xfrm>
+            <a:off x="2202090" y="1848136"/>
+            <a:ext cx="934358" cy="276999"/>
+          </a:xfrm>
+          <a:prstGeom prst="rect">
+            <a:avLst/>
+          </a:prstGeom>
+          <a:solidFill>
+            <a:srgbClr val="2E75B6">
+              <a:alpha val="80000"/>
+            </a:srgbClr>
+          </a:solidFill>
+        </p:spPr>
+        <p:style>
+          <a:lnRef idx="3">
+            <a:schemeClr val="lt1"/>
+          </a:lnRef>
+          <a:fillRef idx="1">
+            <a:schemeClr val="accent1"/>
+          </a:fillRef>
+          <a:effectRef idx="1">
+            <a:schemeClr val="accent1"/>
+          </a:effectRef>
+          <a:fontRef idx="minor">
+            <a:schemeClr val="lt1"/>
+          </a:fontRef>
+        </p:style>
+        <p:txBody>
+          <a:bodyPr wrap="none" rtlCol="0">
+            <a:spAutoFit/>
+          </a:bodyPr>
+          <a:lstStyle/>
+          <a:p>
+            <a:r>
+              <a:rPr lang="de-DE" sz="1200" dirty="0" smtClean="0"/>
+              <a:t>Initialize FTs</a:t>
+            </a:r>
+            <a:endParaRPr lang="de-DE" sz="1200" dirty="0"/>
+          </a:p>
+        </p:txBody>
+      </p:sp>
+      <p:sp>
+        <p:nvSpPr>
+          <p:cNvPr id="10" name="Textfeld 9"/>
+          <p:cNvSpPr txBox="1"/>
+          <p:nvPr/>
+        </p:nvSpPr>
+        <p:spPr>
+          <a:xfrm>
+            <a:off x="1125387" y="873042"/>
+            <a:ext cx="1266437" cy="276999"/>
+          </a:xfrm>
+          <a:prstGeom prst="rect">
+            <a:avLst/>
+          </a:prstGeom>
+          <a:solidFill>
+            <a:schemeClr val="accent1">
+              <a:lumMod val="75000"/>
+            </a:schemeClr>
+          </a:solidFill>
+        </p:spPr>
+        <p:style>
+          <a:lnRef idx="3">
+            <a:schemeClr val="lt1"/>
+          </a:lnRef>
+          <a:fillRef idx="1">
+            <a:schemeClr val="accent1"/>
+          </a:fillRef>
+          <a:effectRef idx="1">
+            <a:schemeClr val="accent1"/>
+          </a:effectRef>
+          <a:fontRef idx="minor">
+            <a:schemeClr val="lt1"/>
+          </a:fontRef>
+        </p:style>
+        <p:txBody>
+          <a:bodyPr wrap="none" rtlCol="0">
+            <a:spAutoFit/>
+          </a:bodyPr>
+          <a:lstStyle/>
+          <a:p>
+            <a:r>
+              <a:rPr lang="de-DE" sz="1200" dirty="0" smtClean="0"/>
+              <a:t>Initialize </a:t>
+            </a:r>
+            <a:r>
+              <a:rPr lang="de-DE" sz="1200" dirty="0" err="1" smtClean="0"/>
+              <a:t>scenario</a:t>
+            </a:r>
+            <a:endParaRPr lang="de-DE" sz="1200" dirty="0"/>
+          </a:p>
+        </p:txBody>
+      </p:sp>
+      <p:sp>
+        <p:nvSpPr>
+          <p:cNvPr id="15" name="Textfeld 14"/>
+          <p:cNvSpPr txBox="1"/>
+          <p:nvPr/>
+        </p:nvSpPr>
+        <p:spPr>
+          <a:xfrm>
+            <a:off x="2997401" y="2438658"/>
+            <a:ext cx="1508884" cy="276999"/>
+          </a:xfrm>
+          <a:prstGeom prst="rect">
+            <a:avLst/>
+          </a:prstGeom>
+        </p:spPr>
+        <p:style>
+          <a:lnRef idx="3">
+            <a:schemeClr val="lt1"/>
+          </a:lnRef>
+          <a:fillRef idx="1">
+            <a:schemeClr val="accent4"/>
+          </a:fillRef>
+          <a:effectRef idx="1">
+            <a:schemeClr val="accent4"/>
+          </a:effectRef>
+          <a:fontRef idx="minor">
+            <a:schemeClr val="lt1"/>
+          </a:fontRef>
+        </p:style>
+        <p:txBody>
+          <a:bodyPr wrap="square" rtlCol="0">
+            <a:spAutoFit/>
+          </a:bodyPr>
+          <a:lstStyle/>
+          <a:p>
+            <a:r>
+              <a:rPr lang="de-DE" sz="1200" dirty="0" smtClean="0"/>
+              <a:t>Initialize </a:t>
+            </a:r>
+            <a:r>
+              <a:rPr lang="de-DE" sz="1200" dirty="0" err="1" smtClean="0"/>
+              <a:t>populations</a:t>
+            </a:r>
+            <a:endParaRPr lang="de-DE" sz="1200" dirty="0"/>
+          </a:p>
+        </p:txBody>
+      </p:sp>
+      <p:sp>
+        <p:nvSpPr>
+          <p:cNvPr id="17" name="Textfeld 16"/>
+          <p:cNvSpPr txBox="1"/>
+          <p:nvPr/>
+        </p:nvSpPr>
+        <p:spPr>
+          <a:xfrm>
+            <a:off x="3423645" y="3456812"/>
+            <a:ext cx="656398" cy="276999"/>
+          </a:xfrm>
+          <a:prstGeom prst="rect">
+            <a:avLst/>
+          </a:prstGeom>
+        </p:spPr>
+        <p:style>
+          <a:lnRef idx="3">
+            <a:schemeClr val="lt1"/>
+          </a:lnRef>
+          <a:fillRef idx="1">
+            <a:schemeClr val="accent6"/>
+          </a:fillRef>
+          <a:effectRef idx="1">
+            <a:schemeClr val="accent6"/>
+          </a:effectRef>
+          <a:fontRef idx="minor">
+            <a:schemeClr val="lt1"/>
+          </a:fontRef>
+        </p:style>
+        <p:txBody>
+          <a:bodyPr wrap="square" rtlCol="0">
+            <a:spAutoFit/>
+          </a:bodyPr>
+          <a:lstStyle/>
+          <a:p>
+            <a:r>
+              <a:rPr lang="de-DE" sz="1200" dirty="0"/>
+              <a:t>G</a:t>
+            </a:r>
+            <a:r>
+              <a:rPr lang="de-DE" sz="1200" dirty="0" smtClean="0"/>
+              <a:t>rowth</a:t>
+            </a:r>
+            <a:endParaRPr lang="de-DE" sz="1200" dirty="0"/>
+          </a:p>
+        </p:txBody>
+      </p:sp>
+      <p:sp>
+        <p:nvSpPr>
+          <p:cNvPr id="18" name="Textfeld 17"/>
+          <p:cNvSpPr txBox="1"/>
+          <p:nvPr/>
+        </p:nvSpPr>
+        <p:spPr>
+          <a:xfrm>
+            <a:off x="3375490" y="3928513"/>
+            <a:ext cx="752707" cy="276999"/>
+          </a:xfrm>
+          <a:prstGeom prst="rect">
+            <a:avLst/>
+          </a:prstGeom>
+        </p:spPr>
+        <p:style>
+          <a:lnRef idx="3">
+            <a:schemeClr val="lt1"/>
+          </a:lnRef>
+          <a:fillRef idx="1">
+            <a:schemeClr val="accent6"/>
+          </a:fillRef>
+          <a:effectRef idx="1">
+            <a:schemeClr val="accent6"/>
+          </a:effectRef>
+          <a:fontRef idx="minor">
+            <a:schemeClr val="lt1"/>
+          </a:fontRef>
+        </p:style>
+        <p:txBody>
+          <a:bodyPr wrap="square" rtlCol="0">
+            <a:spAutoFit/>
+          </a:bodyPr>
+          <a:lstStyle/>
+          <a:p>
+            <a:r>
+              <a:rPr lang="de-DE" sz="1200" dirty="0" err="1"/>
+              <a:t>D</a:t>
+            </a:r>
+            <a:r>
+              <a:rPr lang="de-DE" sz="1200" dirty="0" err="1" smtClean="0"/>
+              <a:t>ispersal</a:t>
+            </a:r>
+            <a:endParaRPr lang="de-DE" sz="1200" dirty="0"/>
+          </a:p>
+        </p:txBody>
+      </p:sp>
+      <p:sp>
+        <p:nvSpPr>
+          <p:cNvPr id="19" name="Textfeld 18"/>
+          <p:cNvSpPr txBox="1"/>
+          <p:nvPr/>
+        </p:nvSpPr>
+        <p:spPr>
+          <a:xfrm>
+            <a:off x="3284472" y="4393861"/>
+            <a:ext cx="934743" cy="276999"/>
+          </a:xfrm>
+          <a:prstGeom prst="rect">
+            <a:avLst/>
+          </a:prstGeom>
+        </p:spPr>
+        <p:style>
+          <a:lnRef idx="3">
+            <a:schemeClr val="lt1"/>
+          </a:lnRef>
+          <a:fillRef idx="1">
+            <a:schemeClr val="accent6"/>
+          </a:fillRef>
+          <a:effectRef idx="1">
+            <a:schemeClr val="accent6"/>
+          </a:effectRef>
+          <a:fontRef idx="minor">
+            <a:schemeClr val="lt1"/>
+          </a:fontRef>
+        </p:style>
+        <p:txBody>
+          <a:bodyPr wrap="square" rtlCol="0">
+            <a:spAutoFit/>
+          </a:bodyPr>
+          <a:lstStyle/>
+          <a:p>
+            <a:r>
+              <a:rPr lang="de-DE" sz="1200" dirty="0" err="1"/>
+              <a:t>D</a:t>
+            </a:r>
+            <a:r>
+              <a:rPr lang="de-DE" sz="1200" dirty="0" err="1" smtClean="0"/>
+              <a:t>isturbance</a:t>
+            </a:r>
+            <a:endParaRPr lang="de-DE" sz="1200" dirty="0"/>
+          </a:p>
+        </p:txBody>
+      </p:sp>
+      <p:sp>
+        <p:nvSpPr>
+          <p:cNvPr id="20" name="Textfeld 19"/>
+          <p:cNvSpPr txBox="1"/>
+          <p:nvPr/>
+        </p:nvSpPr>
+        <p:spPr>
+          <a:xfrm>
+            <a:off x="3436692" y="4859209"/>
+            <a:ext cx="630301" cy="276999"/>
+          </a:xfrm>
+          <a:prstGeom prst="rect">
+            <a:avLst/>
+          </a:prstGeom>
+        </p:spPr>
+        <p:style>
+          <a:lnRef idx="3">
+            <a:schemeClr val="lt1"/>
+          </a:lnRef>
+          <a:fillRef idx="1">
+            <a:schemeClr val="accent6"/>
+          </a:fillRef>
+          <a:effectRef idx="1">
+            <a:schemeClr val="accent6"/>
+          </a:effectRef>
+          <a:fontRef idx="minor">
+            <a:schemeClr val="lt1"/>
+          </a:fontRef>
+        </p:style>
+        <p:txBody>
+          <a:bodyPr wrap="square" rtlCol="0">
+            <a:spAutoFit/>
+          </a:bodyPr>
+          <a:lstStyle/>
+          <a:p>
+            <a:r>
+              <a:rPr lang="de-DE" sz="1200" dirty="0" smtClean="0"/>
+              <a:t>Output</a:t>
+            </a:r>
+            <a:endParaRPr lang="de-DE" sz="1200" dirty="0"/>
+          </a:p>
+        </p:txBody>
+      </p:sp>
+      <p:sp>
+        <p:nvSpPr>
+          <p:cNvPr id="24" name="Textfeld 23"/>
+          <p:cNvSpPr txBox="1"/>
+          <p:nvPr/>
+        </p:nvSpPr>
+        <p:spPr>
+          <a:xfrm>
+            <a:off x="3388924" y="2962867"/>
+            <a:ext cx="725840" cy="276999"/>
+          </a:xfrm>
+          <a:prstGeom prst="rect">
+            <a:avLst/>
+          </a:prstGeom>
+        </p:spPr>
+        <p:style>
+          <a:lnRef idx="3">
+            <a:schemeClr val="lt1"/>
+          </a:lnRef>
+          <a:fillRef idx="1">
+            <a:schemeClr val="accent6"/>
+          </a:fillRef>
+          <a:effectRef idx="1">
+            <a:schemeClr val="accent6"/>
+          </a:effectRef>
+          <a:fontRef idx="minor">
+            <a:schemeClr val="lt1"/>
+          </a:fontRef>
+        </p:style>
+        <p:txBody>
+          <a:bodyPr wrap="square" rtlCol="0">
+            <a:spAutoFit/>
+          </a:bodyPr>
+          <a:lstStyle/>
+          <a:p>
+            <a:r>
+              <a:rPr lang="de-DE" sz="1200" dirty="0" err="1" smtClean="0"/>
+              <a:t>Weather</a:t>
+            </a:r>
+            <a:endParaRPr lang="de-DE" sz="1200" dirty="0"/>
+          </a:p>
+        </p:txBody>
+      </p:sp>
+      <p:cxnSp>
+        <p:nvCxnSpPr>
+          <p:cNvPr id="46" name="Gewinkelte Verbindung 45"/>
+          <p:cNvCxnSpPr>
+            <a:stCxn id="4" idx="2"/>
+            <a:endCxn id="10" idx="1"/>
+          </p:cNvCxnSpPr>
+          <p:nvPr/>
+        </p:nvCxnSpPr>
+        <p:spPr>
+          <a:xfrm rot="16200000" flipH="1">
+            <a:off x="788745" y="674900"/>
+            <a:ext cx="424376" cy="248907"/>
+          </a:xfrm>
+          <a:prstGeom prst="bentConnector2">
+            <a:avLst/>
+          </a:prstGeom>
+          <a:ln>
+            <a:tailEnd type="triangle"/>
+          </a:ln>
+        </p:spPr>
+        <p:style>
+          <a:lnRef idx="1">
+            <a:schemeClr val="dk1"/>
+          </a:lnRef>
+          <a:fillRef idx="0">
+            <a:schemeClr val="dk1"/>
+          </a:fillRef>
+          <a:effectRef idx="0">
+            <a:schemeClr val="dk1"/>
+          </a:effectRef>
+          <a:fontRef idx="minor">
+            <a:schemeClr val="tx1"/>
+          </a:fontRef>
+        </p:style>
+      </p:cxnSp>
+      <p:cxnSp>
+        <p:nvCxnSpPr>
+          <p:cNvPr id="48" name="Gewinkelte Verbindung 47"/>
+          <p:cNvCxnSpPr>
+            <a:stCxn id="10" idx="2"/>
+            <a:endCxn id="7" idx="1"/>
+          </p:cNvCxnSpPr>
+          <p:nvPr/>
+        </p:nvCxnSpPr>
+        <p:spPr>
+          <a:xfrm rot="16200000" flipH="1">
+            <a:off x="1715020" y="1193626"/>
+            <a:ext cx="315564" cy="228393"/>
+          </a:xfrm>
+          <a:prstGeom prst="bentConnector2">
+            <a:avLst/>
+          </a:prstGeom>
+          <a:ln>
+            <a:tailEnd type="triangle"/>
+          </a:ln>
+        </p:spPr>
+        <p:style>
+          <a:lnRef idx="1">
+            <a:schemeClr val="dk1"/>
+          </a:lnRef>
+          <a:fillRef idx="0">
+            <a:schemeClr val="dk1"/>
+          </a:fillRef>
+          <a:effectRef idx="0">
+            <a:schemeClr val="dk1"/>
+          </a:effectRef>
+          <a:fontRef idx="minor">
+            <a:schemeClr val="tx1"/>
+          </a:fontRef>
+        </p:style>
+      </p:cxnSp>
+      <p:cxnSp>
+        <p:nvCxnSpPr>
+          <p:cNvPr id="52" name="Gerade Verbindung mit Pfeil 51"/>
+          <p:cNvCxnSpPr>
+            <a:stCxn id="7" idx="2"/>
+            <a:endCxn id="8" idx="0"/>
+          </p:cNvCxnSpPr>
+          <p:nvPr/>
+        </p:nvCxnSpPr>
+        <p:spPr>
+          <a:xfrm flipH="1">
+            <a:off x="2669269" y="1604104"/>
+            <a:ext cx="1" cy="244032"/>
+          </a:xfrm>
+          <a:prstGeom prst="straightConnector1">
+            <a:avLst/>
+          </a:prstGeom>
+          <a:ln>
+            <a:tailEnd type="triangle"/>
+          </a:ln>
+        </p:spPr>
+        <p:style>
+          <a:lnRef idx="1">
+            <a:schemeClr val="dk1"/>
+          </a:lnRef>
+          <a:fillRef idx="0">
+            <a:schemeClr val="dk1"/>
+          </a:fillRef>
+          <a:effectRef idx="0">
+            <a:schemeClr val="dk1"/>
+          </a:effectRef>
+          <a:fontRef idx="minor">
+            <a:schemeClr val="tx1"/>
+          </a:fontRef>
+        </p:style>
+      </p:cxnSp>
+      <p:cxnSp>
+        <p:nvCxnSpPr>
+          <p:cNvPr id="56" name="Gewinkelte Verbindung 55"/>
+          <p:cNvCxnSpPr>
+            <a:stCxn id="8" idx="2"/>
+            <a:endCxn id="15" idx="1"/>
+          </p:cNvCxnSpPr>
+          <p:nvPr/>
+        </p:nvCxnSpPr>
+        <p:spPr>
+          <a:xfrm rot="16200000" flipH="1">
+            <a:off x="2607324" y="2187080"/>
+            <a:ext cx="452023" cy="328132"/>
+          </a:xfrm>
+          <a:prstGeom prst="bentConnector2">
+            <a:avLst/>
+          </a:prstGeom>
+          <a:ln>
+            <a:tailEnd type="triangle"/>
+          </a:ln>
+        </p:spPr>
+        <p:style>
+          <a:lnRef idx="1">
+            <a:schemeClr val="dk1"/>
+          </a:lnRef>
+          <a:fillRef idx="0">
+            <a:schemeClr val="dk1"/>
+          </a:fillRef>
+          <a:effectRef idx="0">
+            <a:schemeClr val="dk1"/>
+          </a:effectRef>
+          <a:fontRef idx="minor">
+            <a:schemeClr val="tx1"/>
+          </a:fontRef>
+        </p:style>
+      </p:cxnSp>
+      <p:sp>
+        <p:nvSpPr>
+          <p:cNvPr id="76" name="Textfeld 75"/>
+          <p:cNvSpPr txBox="1"/>
+          <p:nvPr/>
+        </p:nvSpPr>
+        <p:spPr>
+          <a:xfrm>
+            <a:off x="2600767" y="4722606"/>
+            <a:ext cx="848309" cy="230832"/>
+          </a:xfrm>
+          <a:prstGeom prst="rect">
+            <a:avLst/>
+          </a:prstGeom>
+          <a:noFill/>
+        </p:spPr>
+        <p:txBody>
+          <a:bodyPr wrap="square" rtlCol="0">
+            <a:spAutoFit/>
+          </a:bodyPr>
+          <a:lstStyle/>
+          <a:p>
+            <a:r>
+              <a:rPr lang="de-DE" sz="900" dirty="0" smtClean="0"/>
+              <a:t>Year = </a:t>
+            </a:r>
+            <a:r>
+              <a:rPr lang="de-DE" sz="900" dirty="0" err="1" smtClean="0"/>
+              <a:t>year</a:t>
+            </a:r>
+            <a:r>
+              <a:rPr lang="de-DE" sz="900" dirty="0" smtClean="0"/>
+              <a:t> +1</a:t>
+            </a:r>
+            <a:endParaRPr lang="de-DE" sz="900" dirty="0"/>
+          </a:p>
+        </p:txBody>
+      </p:sp>
+      <p:sp>
+        <p:nvSpPr>
+          <p:cNvPr id="86" name="Textfeld 85"/>
+          <p:cNvSpPr txBox="1"/>
+          <p:nvPr/>
+        </p:nvSpPr>
+        <p:spPr>
+          <a:xfrm>
+            <a:off x="3713721" y="5180720"/>
+            <a:ext cx="726481" cy="230832"/>
+          </a:xfrm>
+          <a:prstGeom prst="rect">
+            <a:avLst/>
+          </a:prstGeom>
+          <a:noFill/>
+        </p:spPr>
+        <p:txBody>
+          <a:bodyPr wrap="square" rtlCol="0">
+            <a:spAutoFit/>
+          </a:bodyPr>
+          <a:lstStyle/>
+          <a:p>
+            <a:r>
+              <a:rPr lang="de-DE" sz="900" dirty="0" err="1" smtClean="0"/>
+              <a:t>year</a:t>
+            </a:r>
+            <a:r>
+              <a:rPr lang="de-DE" sz="900" dirty="0" smtClean="0"/>
+              <a:t> == </a:t>
+            </a:r>
+            <a:r>
+              <a:rPr lang="de-DE" sz="900" dirty="0" err="1" smtClean="0"/>
+              <a:t>t</a:t>
+            </a:r>
+            <a:r>
+              <a:rPr lang="de-DE" sz="900" baseline="-25000" dirty="0" err="1" smtClean="0"/>
+              <a:t>max</a:t>
+            </a:r>
+            <a:endParaRPr lang="de-DE" sz="900" baseline="-25000" dirty="0"/>
+          </a:p>
+        </p:txBody>
+      </p:sp>
+      <p:sp>
+        <p:nvSpPr>
+          <p:cNvPr id="87" name="Textfeld 86"/>
+          <p:cNvSpPr txBox="1"/>
+          <p:nvPr/>
+        </p:nvSpPr>
+        <p:spPr>
+          <a:xfrm>
+            <a:off x="2575271" y="5536737"/>
+            <a:ext cx="800219" cy="230832"/>
+          </a:xfrm>
+          <a:prstGeom prst="rect">
+            <a:avLst/>
+          </a:prstGeom>
+          <a:noFill/>
+        </p:spPr>
+        <p:txBody>
+          <a:bodyPr wrap="square" rtlCol="0">
+            <a:spAutoFit/>
+          </a:bodyPr>
+          <a:lstStyle/>
+          <a:p>
+            <a:r>
+              <a:rPr lang="de-DE" sz="900" dirty="0" smtClean="0"/>
+              <a:t>Rep = </a:t>
+            </a:r>
+            <a:r>
+              <a:rPr lang="de-DE" sz="900" dirty="0" err="1" smtClean="0"/>
+              <a:t>rep</a:t>
+            </a:r>
+            <a:r>
+              <a:rPr lang="de-DE" sz="900" dirty="0" smtClean="0"/>
+              <a:t> + 1</a:t>
+            </a:r>
+            <a:endParaRPr lang="de-DE" sz="900" dirty="0"/>
+          </a:p>
+        </p:txBody>
+      </p:sp>
+      <p:cxnSp>
+        <p:nvCxnSpPr>
+          <p:cNvPr id="93" name="Gewinkelte Verbindung 92"/>
+          <p:cNvCxnSpPr>
+            <a:stCxn id="98" idx="2"/>
+            <a:endCxn id="10" idx="1"/>
+          </p:cNvCxnSpPr>
+          <p:nvPr/>
+        </p:nvCxnSpPr>
+        <p:spPr>
+          <a:xfrm rot="5400000" flipH="1">
+            <a:off x="755596" y="1381333"/>
+            <a:ext cx="4523353" cy="3783772"/>
+          </a:xfrm>
+          <a:prstGeom prst="bentConnector4">
+            <a:avLst>
+              <a:gd name="adj1" fmla="val -12871"/>
+              <a:gd name="adj2" fmla="val 121831"/>
+            </a:avLst>
+          </a:prstGeom>
+          <a:ln>
+            <a:tailEnd type="triangle"/>
+          </a:ln>
+        </p:spPr>
+        <p:style>
+          <a:lnRef idx="1">
+            <a:schemeClr val="dk1"/>
+          </a:lnRef>
+          <a:fillRef idx="0">
+            <a:schemeClr val="dk1"/>
+          </a:fillRef>
+          <a:effectRef idx="0">
+            <a:schemeClr val="dk1"/>
+          </a:effectRef>
+          <a:fontRef idx="minor">
+            <a:schemeClr val="tx1"/>
+          </a:fontRef>
+        </p:style>
+      </p:cxnSp>
+      <p:sp>
+        <p:nvSpPr>
+          <p:cNvPr id="96" name="Textfeld 95"/>
+          <p:cNvSpPr txBox="1"/>
+          <p:nvPr/>
+        </p:nvSpPr>
+        <p:spPr>
+          <a:xfrm>
+            <a:off x="3994406" y="5871503"/>
+            <a:ext cx="891591" cy="230832"/>
+          </a:xfrm>
+          <a:prstGeom prst="rect">
+            <a:avLst/>
+          </a:prstGeom>
+          <a:noFill/>
+        </p:spPr>
+        <p:txBody>
+          <a:bodyPr wrap="none" rtlCol="0">
+            <a:spAutoFit/>
+          </a:bodyPr>
+          <a:lstStyle/>
+          <a:p>
+            <a:r>
+              <a:rPr lang="de-DE" sz="900" dirty="0" err="1" smtClean="0"/>
+              <a:t>Scen</a:t>
+            </a:r>
+            <a:r>
+              <a:rPr lang="de-DE" sz="900" dirty="0" smtClean="0"/>
+              <a:t> = </a:t>
+            </a:r>
+            <a:r>
+              <a:rPr lang="de-DE" sz="900" dirty="0" err="1" smtClean="0"/>
+              <a:t>scen</a:t>
+            </a:r>
+            <a:r>
+              <a:rPr lang="de-DE" sz="900" dirty="0" smtClean="0"/>
+              <a:t> + 1</a:t>
+            </a:r>
+            <a:endParaRPr lang="de-DE" sz="900" dirty="0"/>
+          </a:p>
+        </p:txBody>
+      </p:sp>
+      <p:sp>
+        <p:nvSpPr>
+          <p:cNvPr id="97" name="Textfeld 96"/>
+          <p:cNvSpPr txBox="1"/>
+          <p:nvPr/>
+        </p:nvSpPr>
+        <p:spPr>
+          <a:xfrm>
+            <a:off x="4909159" y="5827077"/>
+            <a:ext cx="800219" cy="230832"/>
+          </a:xfrm>
+          <a:prstGeom prst="rect">
+            <a:avLst/>
+          </a:prstGeom>
+          <a:noFill/>
+        </p:spPr>
+        <p:txBody>
+          <a:bodyPr wrap="none" rtlCol="0">
+            <a:spAutoFit/>
+          </a:bodyPr>
+          <a:lstStyle/>
+          <a:p>
+            <a:r>
+              <a:rPr lang="de-DE" sz="900" dirty="0" err="1" smtClean="0"/>
+              <a:t>rep</a:t>
+            </a:r>
+            <a:r>
+              <a:rPr lang="de-DE" sz="900" dirty="0" smtClean="0"/>
+              <a:t> == </a:t>
+            </a:r>
+            <a:r>
+              <a:rPr lang="de-DE" sz="900" dirty="0" err="1" smtClean="0"/>
+              <a:t>rep</a:t>
+            </a:r>
+            <a:r>
+              <a:rPr lang="de-DE" sz="900" baseline="-25000" dirty="0" err="1" smtClean="0"/>
+              <a:t>max</a:t>
+            </a:r>
+            <a:endParaRPr lang="de-DE" sz="900" baseline="-25000" dirty="0"/>
+          </a:p>
+        </p:txBody>
+      </p:sp>
+      <p:sp>
+        <p:nvSpPr>
+          <p:cNvPr id="98" name="Textfeld 97"/>
+          <p:cNvSpPr txBox="1"/>
+          <p:nvPr/>
+        </p:nvSpPr>
+        <p:spPr>
+          <a:xfrm>
+            <a:off x="4402080" y="5257896"/>
+            <a:ext cx="1014158" cy="276999"/>
+          </a:xfrm>
+          <a:prstGeom prst="rect">
+            <a:avLst/>
+          </a:prstGeom>
+        </p:spPr>
+        <p:style>
+          <a:lnRef idx="3">
+            <a:schemeClr val="lt1"/>
+          </a:lnRef>
+          <a:fillRef idx="1">
+            <a:schemeClr val="accent2"/>
+          </a:fillRef>
+          <a:effectRef idx="1">
+            <a:schemeClr val="accent2"/>
+          </a:effectRef>
+          <a:fontRef idx="minor">
+            <a:schemeClr val="lt1"/>
+          </a:fontRef>
+        </p:style>
+        <p:txBody>
+          <a:bodyPr wrap="square" rtlCol="0">
+            <a:spAutoFit/>
+          </a:bodyPr>
+          <a:lstStyle/>
+          <a:p>
+            <a:r>
+              <a:rPr lang="de-DE" sz="1200" dirty="0" smtClean="0"/>
+              <a:t>Write </a:t>
+            </a:r>
+            <a:r>
+              <a:rPr lang="de-DE" sz="1200" dirty="0" err="1" smtClean="0"/>
+              <a:t>output</a:t>
+            </a:r>
+            <a:endParaRPr lang="de-DE" sz="1200" dirty="0"/>
+          </a:p>
+        </p:txBody>
+      </p:sp>
+      <p:cxnSp>
+        <p:nvCxnSpPr>
+          <p:cNvPr id="111" name="Gewinkelte Verbindung 110"/>
+          <p:cNvCxnSpPr>
+            <a:stCxn id="20" idx="2"/>
+            <a:endCxn id="98" idx="1"/>
+          </p:cNvCxnSpPr>
+          <p:nvPr/>
+        </p:nvCxnSpPr>
+        <p:spPr>
+          <a:xfrm rot="16200000" flipH="1">
+            <a:off x="3946867" y="4941183"/>
+            <a:ext cx="260188" cy="650237"/>
+          </a:xfrm>
+          <a:prstGeom prst="bentConnector2">
+            <a:avLst/>
+          </a:prstGeom>
+          <a:ln>
+            <a:tailEnd type="triangle"/>
+          </a:ln>
+        </p:spPr>
+        <p:style>
+          <a:lnRef idx="1">
+            <a:schemeClr val="dk1"/>
+          </a:lnRef>
+          <a:fillRef idx="0">
+            <a:schemeClr val="dk1"/>
+          </a:fillRef>
+          <a:effectRef idx="0">
+            <a:schemeClr val="dk1"/>
+          </a:effectRef>
+          <a:fontRef idx="minor">
+            <a:schemeClr val="tx1"/>
+          </a:fontRef>
+        </p:style>
+      </p:cxnSp>
+      <p:cxnSp>
+        <p:nvCxnSpPr>
+          <p:cNvPr id="116" name="Gerade Verbindung mit Pfeil 115"/>
+          <p:cNvCxnSpPr>
+            <a:stCxn id="98" idx="2"/>
+            <a:endCxn id="120" idx="0"/>
+          </p:cNvCxnSpPr>
+          <p:nvPr/>
+        </p:nvCxnSpPr>
+        <p:spPr>
+          <a:xfrm>
+            <a:off x="4909159" y="5534895"/>
+            <a:ext cx="0" cy="1142913"/>
+          </a:xfrm>
+          <a:prstGeom prst="straightConnector1">
+            <a:avLst/>
+          </a:prstGeom>
+          <a:ln>
+            <a:tailEnd type="triangle"/>
+          </a:ln>
+        </p:spPr>
+        <p:style>
+          <a:lnRef idx="1">
+            <a:schemeClr val="dk1"/>
+          </a:lnRef>
+          <a:fillRef idx="0">
+            <a:schemeClr val="dk1"/>
+          </a:fillRef>
+          <a:effectRef idx="0">
+            <a:schemeClr val="dk1"/>
+          </a:effectRef>
+          <a:fontRef idx="minor">
+            <a:schemeClr val="tx1"/>
+          </a:fontRef>
+        </p:style>
+      </p:cxnSp>
+      <p:sp>
+        <p:nvSpPr>
+          <p:cNvPr id="118" name="Textfeld 117"/>
+          <p:cNvSpPr txBox="1"/>
+          <p:nvPr/>
+        </p:nvSpPr>
+        <p:spPr>
+          <a:xfrm>
+            <a:off x="4885997" y="6409783"/>
+            <a:ext cx="914033" cy="230832"/>
+          </a:xfrm>
+          <a:prstGeom prst="rect">
+            <a:avLst/>
+          </a:prstGeom>
+          <a:noFill/>
+        </p:spPr>
+        <p:txBody>
+          <a:bodyPr wrap="none" rtlCol="0">
+            <a:spAutoFit/>
+          </a:bodyPr>
+          <a:lstStyle/>
+          <a:p>
+            <a:r>
+              <a:rPr lang="de-DE" sz="900" dirty="0" err="1" smtClean="0"/>
+              <a:t>Scen</a:t>
+            </a:r>
+            <a:r>
+              <a:rPr lang="de-DE" sz="900" dirty="0" smtClean="0"/>
+              <a:t> == </a:t>
+            </a:r>
+            <a:r>
+              <a:rPr lang="de-DE" sz="900" dirty="0" err="1" smtClean="0"/>
+              <a:t>scen</a:t>
+            </a:r>
+            <a:r>
+              <a:rPr lang="de-DE" sz="900" baseline="-25000" dirty="0" err="1" smtClean="0"/>
+              <a:t>max</a:t>
+            </a:r>
+            <a:endParaRPr lang="de-DE" sz="900" baseline="-25000" dirty="0"/>
+          </a:p>
+        </p:txBody>
+      </p:sp>
+      <p:sp>
+        <p:nvSpPr>
+          <p:cNvPr id="120" name="Textfeld 119"/>
+          <p:cNvSpPr txBox="1"/>
+          <p:nvPr/>
+        </p:nvSpPr>
+        <p:spPr>
+          <a:xfrm>
+            <a:off x="4548323" y="6677808"/>
+            <a:ext cx="721672" cy="276999"/>
+          </a:xfrm>
+          <a:prstGeom prst="rect">
+            <a:avLst/>
+          </a:prstGeom>
+        </p:spPr>
+        <p:style>
+          <a:lnRef idx="3">
+            <a:schemeClr val="lt1"/>
+          </a:lnRef>
+          <a:fillRef idx="1">
+            <a:schemeClr val="dk1"/>
+          </a:fillRef>
+          <a:effectRef idx="1">
+            <a:schemeClr val="dk1"/>
+          </a:effectRef>
+          <a:fontRef idx="minor">
+            <a:schemeClr val="lt1"/>
+          </a:fontRef>
+        </p:style>
+        <p:txBody>
+          <a:bodyPr wrap="none" rtlCol="0">
+            <a:spAutoFit/>
+          </a:bodyPr>
+          <a:lstStyle/>
+          <a:p>
+            <a:r>
+              <a:rPr lang="de-DE" sz="1200" dirty="0" smtClean="0"/>
+              <a:t>End </a:t>
+            </a:r>
+            <a:r>
+              <a:rPr lang="de-DE" sz="1200" dirty="0" err="1" smtClean="0"/>
+              <a:t>BiTZ</a:t>
+            </a:r>
+            <a:endParaRPr lang="de-DE" sz="1200" dirty="0"/>
+          </a:p>
+        </p:txBody>
+      </p:sp>
+      <p:cxnSp>
+        <p:nvCxnSpPr>
+          <p:cNvPr id="84" name="Gerade Verbindung mit Pfeil 83"/>
+          <p:cNvCxnSpPr>
+            <a:stCxn id="15" idx="2"/>
+            <a:endCxn id="24" idx="0"/>
+          </p:cNvCxnSpPr>
+          <p:nvPr/>
+        </p:nvCxnSpPr>
+        <p:spPr>
+          <a:xfrm>
+            <a:off x="3751843" y="2715657"/>
+            <a:ext cx="1" cy="247210"/>
+          </a:xfrm>
+          <a:prstGeom prst="straightConnector1">
+            <a:avLst/>
+          </a:prstGeom>
+          <a:ln>
+            <a:tailEnd type="triangle"/>
+          </a:ln>
+        </p:spPr>
+        <p:style>
+          <a:lnRef idx="1">
+            <a:schemeClr val="dk1"/>
+          </a:lnRef>
+          <a:fillRef idx="0">
+            <a:schemeClr val="dk1"/>
+          </a:fillRef>
+          <a:effectRef idx="0">
+            <a:schemeClr val="dk1"/>
+          </a:effectRef>
+          <a:fontRef idx="minor">
+            <a:schemeClr val="tx1"/>
+          </a:fontRef>
+        </p:style>
+      </p:cxnSp>
+      <p:cxnSp>
+        <p:nvCxnSpPr>
+          <p:cNvPr id="88" name="Gerade Verbindung mit Pfeil 87"/>
+          <p:cNvCxnSpPr>
+            <a:stCxn id="24" idx="2"/>
+            <a:endCxn id="17" idx="0"/>
+          </p:cNvCxnSpPr>
+          <p:nvPr/>
+        </p:nvCxnSpPr>
+        <p:spPr>
+          <a:xfrm>
+            <a:off x="3751844" y="3239866"/>
+            <a:ext cx="0" cy="216946"/>
+          </a:xfrm>
+          <a:prstGeom prst="straightConnector1">
+            <a:avLst/>
+          </a:prstGeom>
+          <a:ln>
+            <a:tailEnd type="triangle"/>
+          </a:ln>
+        </p:spPr>
+        <p:style>
+          <a:lnRef idx="1">
+            <a:schemeClr val="dk1"/>
+          </a:lnRef>
+          <a:fillRef idx="0">
+            <a:schemeClr val="dk1"/>
+          </a:fillRef>
+          <a:effectRef idx="0">
+            <a:schemeClr val="dk1"/>
+          </a:effectRef>
+          <a:fontRef idx="minor">
+            <a:schemeClr val="tx1"/>
+          </a:fontRef>
+        </p:style>
+      </p:cxnSp>
+      <p:cxnSp>
+        <p:nvCxnSpPr>
+          <p:cNvPr id="90" name="Gerade Verbindung mit Pfeil 89"/>
+          <p:cNvCxnSpPr>
+            <a:stCxn id="17" idx="2"/>
+            <a:endCxn id="18" idx="0"/>
+          </p:cNvCxnSpPr>
+          <p:nvPr/>
+        </p:nvCxnSpPr>
+        <p:spPr>
+          <a:xfrm>
+            <a:off x="3751844" y="3733811"/>
+            <a:ext cx="0" cy="194702"/>
+          </a:xfrm>
+          <a:prstGeom prst="straightConnector1">
+            <a:avLst/>
+          </a:prstGeom>
+          <a:ln>
+            <a:tailEnd type="triangle"/>
+          </a:ln>
+        </p:spPr>
+        <p:style>
+          <a:lnRef idx="1">
+            <a:schemeClr val="dk1"/>
+          </a:lnRef>
+          <a:fillRef idx="0">
+            <a:schemeClr val="dk1"/>
+          </a:fillRef>
+          <a:effectRef idx="0">
+            <a:schemeClr val="dk1"/>
+          </a:effectRef>
+          <a:fontRef idx="minor">
+            <a:schemeClr val="tx1"/>
+          </a:fontRef>
+        </p:style>
+      </p:cxnSp>
+      <p:cxnSp>
+        <p:nvCxnSpPr>
+          <p:cNvPr id="94" name="Gerade Verbindung mit Pfeil 93"/>
+          <p:cNvCxnSpPr>
+            <a:stCxn id="18" idx="2"/>
+            <a:endCxn id="19" idx="0"/>
+          </p:cNvCxnSpPr>
+          <p:nvPr/>
+        </p:nvCxnSpPr>
+        <p:spPr>
+          <a:xfrm>
+            <a:off x="3751844" y="4205512"/>
+            <a:ext cx="0" cy="188349"/>
+          </a:xfrm>
+          <a:prstGeom prst="straightConnector1">
+            <a:avLst/>
+          </a:prstGeom>
+          <a:ln>
+            <a:tailEnd type="triangle"/>
+          </a:ln>
+        </p:spPr>
+        <p:style>
+          <a:lnRef idx="1">
+            <a:schemeClr val="dk1"/>
+          </a:lnRef>
+          <a:fillRef idx="0">
+            <a:schemeClr val="dk1"/>
+          </a:fillRef>
+          <a:effectRef idx="0">
+            <a:schemeClr val="dk1"/>
+          </a:effectRef>
+          <a:fontRef idx="minor">
+            <a:schemeClr val="tx1"/>
+          </a:fontRef>
+        </p:style>
+      </p:cxnSp>
+      <p:cxnSp>
+        <p:nvCxnSpPr>
+          <p:cNvPr id="99" name="Gerade Verbindung mit Pfeil 98"/>
+          <p:cNvCxnSpPr>
+            <a:stCxn id="19" idx="2"/>
+            <a:endCxn id="20" idx="0"/>
+          </p:cNvCxnSpPr>
+          <p:nvPr/>
+        </p:nvCxnSpPr>
+        <p:spPr>
+          <a:xfrm flipH="1">
+            <a:off x="3751843" y="4670860"/>
+            <a:ext cx="1" cy="188349"/>
+          </a:xfrm>
+          <a:prstGeom prst="straightConnector1">
+            <a:avLst/>
+          </a:prstGeom>
+          <a:ln>
+            <a:tailEnd type="triangle"/>
+          </a:ln>
+        </p:spPr>
+        <p:style>
+          <a:lnRef idx="1">
+            <a:schemeClr val="dk1"/>
+          </a:lnRef>
+          <a:fillRef idx="0">
+            <a:schemeClr val="dk1"/>
+          </a:fillRef>
+          <a:effectRef idx="0">
+            <a:schemeClr val="dk1"/>
+          </a:effectRef>
+          <a:fontRef idx="minor">
+            <a:schemeClr val="tx1"/>
+          </a:fontRef>
+        </p:style>
+      </p:cxnSp>
+      <p:cxnSp>
+        <p:nvCxnSpPr>
+          <p:cNvPr id="106" name="Gewinkelte Verbindung 105"/>
+          <p:cNvCxnSpPr>
+            <a:stCxn id="20" idx="1"/>
+            <a:endCxn id="24" idx="1"/>
+          </p:cNvCxnSpPr>
+          <p:nvPr/>
+        </p:nvCxnSpPr>
+        <p:spPr>
+          <a:xfrm rot="10800000">
+            <a:off x="3388924" y="3101367"/>
+            <a:ext cx="47768" cy="1896342"/>
+          </a:xfrm>
+          <a:prstGeom prst="bentConnector3">
+            <a:avLst>
+              <a:gd name="adj1" fmla="val 1854731"/>
+            </a:avLst>
+          </a:prstGeom>
+          <a:ln>
+            <a:solidFill>
+              <a:schemeClr val="tx1"/>
+            </a:solidFill>
+            <a:tailEnd type="triangle"/>
+          </a:ln>
+        </p:spPr>
+        <p:style>
+          <a:lnRef idx="1">
+            <a:schemeClr val="accent1"/>
+          </a:lnRef>
+          <a:fillRef idx="0">
+            <a:schemeClr val="accent1"/>
+          </a:fillRef>
+          <a:effectRef idx="0">
+            <a:schemeClr val="accent1"/>
+          </a:effectRef>
+          <a:fontRef idx="minor">
+            <a:schemeClr val="tx1"/>
+          </a:fontRef>
+        </p:style>
+      </p:cxnSp>
+      <p:cxnSp>
+        <p:nvCxnSpPr>
+          <p:cNvPr id="119" name="Gewinkelte Verbindung 118"/>
+          <p:cNvCxnSpPr>
+            <a:stCxn id="98" idx="2"/>
+            <a:endCxn id="15" idx="1"/>
+          </p:cNvCxnSpPr>
+          <p:nvPr/>
+        </p:nvCxnSpPr>
+        <p:spPr>
+          <a:xfrm rot="5400000" flipH="1">
+            <a:off x="2474411" y="3100148"/>
+            <a:ext cx="2957737" cy="1911758"/>
+          </a:xfrm>
+          <a:prstGeom prst="bentConnector4">
+            <a:avLst>
+              <a:gd name="adj1" fmla="val -7729"/>
+              <a:gd name="adj2" fmla="val 134917"/>
+            </a:avLst>
+          </a:prstGeom>
+          <a:ln>
+            <a:solidFill>
+              <a:schemeClr val="tx1"/>
+            </a:solidFill>
+            <a:tailEnd type="triangle"/>
+          </a:ln>
+        </p:spPr>
+        <p:style>
+          <a:lnRef idx="1">
+            <a:schemeClr val="accent1"/>
+          </a:lnRef>
+          <a:fillRef idx="0">
+            <a:schemeClr val="accent1"/>
+          </a:fillRef>
+          <a:effectRef idx="0">
+            <a:schemeClr val="accent1"/>
+          </a:effectRef>
+          <a:fontRef idx="minor">
+            <a:schemeClr val="tx1"/>
+          </a:fontRef>
+        </p:style>
+      </p:cxnSp>
+    </p:spTree>
+    <p:extLst>
+      <p:ext uri="{BB962C8B-B14F-4D97-AF65-F5344CB8AC3E}">
+        <p14:creationId xmlns:p14="http://schemas.microsoft.com/office/powerpoint/2010/main" val="2736495421"/>
       </p:ext>
     </p:extLst>
   </p:cSld>

</xml_diff>